<commit_message>
update project to reflect n_classes for labels
</commit_message>
<xml_diff>
--- a/CreateLabels.pptx
+++ b/CreateLabels.pptx
@@ -7,7 +7,8 @@
   <p:sldIdLst>
     <p:sldId id="257" r:id="rId2"/>
     <p:sldId id="256" r:id="rId3"/>
-    <p:sldId id="258" r:id="rId4"/>
+    <p:sldId id="259" r:id="rId4"/>
+    <p:sldId id="258" r:id="rId5"/>
   </p:sldIdLst>
   <p:sldSz cx="12192000" cy="6858000"/>
   <p:notesSz cx="6858000" cy="9144000"/>
@@ -3440,7 +3441,7 @@
         </p:blipFill>
         <p:spPr>
           <a:xfrm>
-            <a:off x="1472051" y="903889"/>
+            <a:off x="742594" y="915297"/>
             <a:ext cx="3025020" cy="4219903"/>
           </a:xfrm>
           <a:prstGeom prst="rect">
@@ -3470,7 +3471,7 @@
         </p:blipFill>
         <p:spPr>
           <a:xfrm>
-            <a:off x="5753709" y="988871"/>
+            <a:off x="4660633" y="915298"/>
             <a:ext cx="3087192" cy="4219903"/>
           </a:xfrm>
           <a:prstGeom prst="rect">
@@ -3478,6 +3479,296 @@
           </a:prstGeom>
         </p:spPr>
       </p:pic>
+      <p:grpSp>
+        <p:nvGrpSpPr>
+          <p:cNvPr id="14" name="Group 13">
+            <a:extLst>
+              <a:ext uri="{FF2B5EF4-FFF2-40B4-BE49-F238E27FC236}">
+                <a16:creationId xmlns:a16="http://schemas.microsoft.com/office/drawing/2014/main" id="{221694E4-C4BE-C149-A6AB-B941213CDC3B}"/>
+              </a:ext>
+            </a:extLst>
+          </p:cNvPr>
+          <p:cNvGrpSpPr/>
+          <p:nvPr/>
+        </p:nvGrpSpPr>
+        <p:grpSpPr>
+          <a:xfrm>
+            <a:off x="8505116" y="1120489"/>
+            <a:ext cx="3562460" cy="4188132"/>
+            <a:chOff x="8505116" y="1120489"/>
+            <a:chExt cx="3562460" cy="4188132"/>
+          </a:xfrm>
+        </p:grpSpPr>
+        <p:pic>
+          <p:nvPicPr>
+            <p:cNvPr id="6" name="Picture 5">
+              <a:extLst>
+                <a:ext uri="{FF2B5EF4-FFF2-40B4-BE49-F238E27FC236}">
+                  <a16:creationId xmlns:a16="http://schemas.microsoft.com/office/drawing/2014/main" id="{3D0B22A8-9F6C-B84C-A5F0-F2D3390E71CB}"/>
+                </a:ext>
+              </a:extLst>
+            </p:cNvPr>
+            <p:cNvPicPr>
+              <a:picLocks noChangeAspect="1"/>
+            </p:cNvPicPr>
+            <p:nvPr/>
+          </p:nvPicPr>
+          <p:blipFill rotWithShape="1">
+            <a:blip r:embed="rId3"/>
+            <a:srcRect t="49716"/>
+            <a:stretch/>
+          </p:blipFill>
+          <p:spPr>
+            <a:xfrm>
+              <a:off x="8505116" y="3186702"/>
+              <a:ext cx="3087192" cy="2121919"/>
+            </a:xfrm>
+            <a:prstGeom prst="rect">
+              <a:avLst/>
+            </a:prstGeom>
+          </p:spPr>
+        </p:pic>
+        <p:grpSp>
+          <p:nvGrpSpPr>
+            <p:cNvPr id="8" name="Group 7">
+              <a:extLst>
+                <a:ext uri="{FF2B5EF4-FFF2-40B4-BE49-F238E27FC236}">
+                  <a16:creationId xmlns:a16="http://schemas.microsoft.com/office/drawing/2014/main" id="{5F08ACD0-39E5-B147-9C71-447362520380}"/>
+                </a:ext>
+              </a:extLst>
+            </p:cNvPr>
+            <p:cNvGrpSpPr/>
+            <p:nvPr/>
+          </p:nvGrpSpPr>
+          <p:grpSpPr>
+            <a:xfrm>
+              <a:off x="8600575" y="1120489"/>
+              <a:ext cx="3467001" cy="2079077"/>
+              <a:chOff x="515008" y="2528407"/>
+              <a:chExt cx="6426745" cy="3347533"/>
+            </a:xfrm>
+          </p:grpSpPr>
+          <p:pic>
+            <p:nvPicPr>
+              <p:cNvPr id="9" name="Picture 8">
+                <a:extLst>
+                  <a:ext uri="{FF2B5EF4-FFF2-40B4-BE49-F238E27FC236}">
+                    <a16:creationId xmlns:a16="http://schemas.microsoft.com/office/drawing/2014/main" id="{E66A583A-AF53-E74C-BE2C-8E4CA0936518}"/>
+                  </a:ext>
+                </a:extLst>
+              </p:cNvPr>
+              <p:cNvPicPr>
+                <a:picLocks noChangeAspect="1"/>
+              </p:cNvPicPr>
+              <p:nvPr/>
+            </p:nvPicPr>
+            <p:blipFill>
+              <a:blip r:embed="rId4"/>
+              <a:stretch>
+                <a:fillRect/>
+              </a:stretch>
+            </p:blipFill>
+            <p:spPr>
+              <a:xfrm>
+                <a:off x="515008" y="2528407"/>
+                <a:ext cx="4147863" cy="3347533"/>
+              </a:xfrm>
+              <a:prstGeom prst="rect">
+                <a:avLst/>
+              </a:prstGeom>
+            </p:spPr>
+          </p:pic>
+          <p:cxnSp>
+            <p:nvCxnSpPr>
+              <p:cNvPr id="10" name="Straight Arrow Connector 9">
+                <a:extLst>
+                  <a:ext uri="{FF2B5EF4-FFF2-40B4-BE49-F238E27FC236}">
+                    <a16:creationId xmlns:a16="http://schemas.microsoft.com/office/drawing/2014/main" id="{0AFCB3FD-DD40-B84A-9006-D3FB94E249B0}"/>
+                  </a:ext>
+                </a:extLst>
+              </p:cNvPr>
+              <p:cNvCxnSpPr>
+                <a:cxnSpLocks/>
+              </p:cNvCxnSpPr>
+              <p:nvPr/>
+            </p:nvCxnSpPr>
+            <p:spPr>
+              <a:xfrm flipH="1" flipV="1">
+                <a:off x="3825768" y="3594542"/>
+                <a:ext cx="837103" cy="304798"/>
+              </a:xfrm>
+              <a:prstGeom prst="straightConnector1">
+                <a:avLst/>
+              </a:prstGeom>
+              <a:ln w="38100">
+                <a:solidFill>
+                  <a:srgbClr val="FF0000"/>
+                </a:solidFill>
+                <a:tailEnd type="triangle"/>
+              </a:ln>
+            </p:spPr>
+            <p:style>
+              <a:lnRef idx="1">
+                <a:schemeClr val="accent1"/>
+              </a:lnRef>
+              <a:fillRef idx="0">
+                <a:schemeClr val="accent1"/>
+              </a:fillRef>
+              <a:effectRef idx="0">
+                <a:schemeClr val="accent1"/>
+              </a:effectRef>
+              <a:fontRef idx="minor">
+                <a:schemeClr val="tx1"/>
+              </a:fontRef>
+            </p:style>
+          </p:cxnSp>
+          <p:sp>
+            <p:nvSpPr>
+              <p:cNvPr id="11" name="TextBox 10">
+                <a:extLst>
+                  <a:ext uri="{FF2B5EF4-FFF2-40B4-BE49-F238E27FC236}">
+                    <a16:creationId xmlns:a16="http://schemas.microsoft.com/office/drawing/2014/main" id="{A2827571-A1A9-3342-AF76-F67DC42F6CAE}"/>
+                  </a:ext>
+                </a:extLst>
+              </p:cNvPr>
+              <p:cNvSpPr txBox="1"/>
+              <p:nvPr/>
+            </p:nvSpPr>
+            <p:spPr>
+              <a:xfrm>
+                <a:off x="4662871" y="3746941"/>
+                <a:ext cx="2278882" cy="743329"/>
+              </a:xfrm>
+              <a:prstGeom prst="rect">
+                <a:avLst/>
+              </a:prstGeom>
+              <a:noFill/>
+            </p:spPr>
+            <p:txBody>
+              <a:bodyPr wrap="none" rtlCol="0">
+                <a:spAutoFit/>
+              </a:bodyPr>
+              <a:lstStyle/>
+              <a:p>
+                <a:r>
+                  <a:rPr lang="en-US" sz="1200" b="1" dirty="0">
+                    <a:solidFill>
+                      <a:srgbClr val="FF0000"/>
+                    </a:solidFill>
+                  </a:rPr>
+                  <a:t>Label Value: 200</a:t>
+                </a:r>
+              </a:p>
+              <a:p>
+                <a:r>
+                  <a:rPr lang="en-US" sz="1200" b="1" dirty="0">
+                    <a:solidFill>
+                      <a:srgbClr val="FF0000"/>
+                    </a:solidFill>
+                  </a:rPr>
+                  <a:t>Bright grains</a:t>
+                </a:r>
+              </a:p>
+            </p:txBody>
+          </p:sp>
+          <p:cxnSp>
+            <p:nvCxnSpPr>
+              <p:cNvPr id="12" name="Straight Arrow Connector 11">
+                <a:extLst>
+                  <a:ext uri="{FF2B5EF4-FFF2-40B4-BE49-F238E27FC236}">
+                    <a16:creationId xmlns:a16="http://schemas.microsoft.com/office/drawing/2014/main" id="{2780AD78-E1D0-1B49-8CA4-F6CFED13BEFA}"/>
+                  </a:ext>
+                </a:extLst>
+              </p:cNvPr>
+              <p:cNvCxnSpPr>
+                <a:cxnSpLocks/>
+              </p:cNvCxnSpPr>
+              <p:nvPr/>
+            </p:nvCxnSpPr>
+            <p:spPr>
+              <a:xfrm flipH="1" flipV="1">
+                <a:off x="3715409" y="4834096"/>
+                <a:ext cx="837103" cy="304798"/>
+              </a:xfrm>
+              <a:prstGeom prst="straightConnector1">
+                <a:avLst/>
+              </a:prstGeom>
+              <a:ln w="38100">
+                <a:solidFill>
+                  <a:srgbClr val="0070C0"/>
+                </a:solidFill>
+                <a:tailEnd type="triangle"/>
+              </a:ln>
+            </p:spPr>
+            <p:style>
+              <a:lnRef idx="1">
+                <a:schemeClr val="accent1"/>
+              </a:lnRef>
+              <a:fillRef idx="0">
+                <a:schemeClr val="accent1"/>
+              </a:fillRef>
+              <a:effectRef idx="0">
+                <a:schemeClr val="accent1"/>
+              </a:effectRef>
+              <a:fontRef idx="minor">
+                <a:schemeClr val="tx1"/>
+              </a:fontRef>
+            </p:style>
+          </p:cxnSp>
+          <p:sp>
+            <p:nvSpPr>
+              <p:cNvPr id="13" name="TextBox 12">
+                <a:extLst>
+                  <a:ext uri="{FF2B5EF4-FFF2-40B4-BE49-F238E27FC236}">
+                    <a16:creationId xmlns:a16="http://schemas.microsoft.com/office/drawing/2014/main" id="{C351C1E8-1668-2041-BB64-8F132175D118}"/>
+                  </a:ext>
+                </a:extLst>
+              </p:cNvPr>
+              <p:cNvSpPr txBox="1"/>
+              <p:nvPr/>
+            </p:nvSpPr>
+            <p:spPr>
+              <a:xfrm>
+                <a:off x="4552512" y="4986495"/>
+                <a:ext cx="2278882" cy="743329"/>
+              </a:xfrm>
+              <a:prstGeom prst="rect">
+                <a:avLst/>
+              </a:prstGeom>
+              <a:noFill/>
+              <a:ln>
+                <a:noFill/>
+              </a:ln>
+            </p:spPr>
+            <p:txBody>
+              <a:bodyPr wrap="none" rtlCol="0">
+                <a:spAutoFit/>
+              </a:bodyPr>
+              <a:lstStyle/>
+              <a:p>
+                <a:r>
+                  <a:rPr lang="en-US" sz="1200" b="1" dirty="0">
+                    <a:solidFill>
+                      <a:srgbClr val="0070C0"/>
+                    </a:solidFill>
+                  </a:rPr>
+                  <a:t>Label Value: 100</a:t>
+                </a:r>
+              </a:p>
+              <a:p>
+                <a:r>
+                  <a:rPr lang="en-US" sz="1200" b="1" dirty="0">
+                    <a:solidFill>
+                      <a:srgbClr val="0070C0"/>
+                    </a:solidFill>
+                  </a:rPr>
+                  <a:t>blue-dye epoxy</a:t>
+                </a:r>
+              </a:p>
+            </p:txBody>
+          </p:sp>
+        </p:grpSp>
+      </p:grpSp>
     </p:spTree>
     <p:extLst>
       <p:ext uri="{BB962C8B-B14F-4D97-AF65-F5344CB8AC3E}">
@@ -3513,7 +3804,7 @@
           <p:cNvPr id="2" name="Picture 1">
             <a:extLst>
               <a:ext uri="{FF2B5EF4-FFF2-40B4-BE49-F238E27FC236}">
-                <a16:creationId xmlns:a16="http://schemas.microsoft.com/office/drawing/2014/main" id="{2A4485F3-32CA-2F41-8176-3055812E9171}"/>
+                <a16:creationId xmlns:a16="http://schemas.microsoft.com/office/drawing/2014/main" id="{F79D5650-C625-6149-985F-D1D4AC096F46}"/>
               </a:ext>
             </a:extLst>
           </p:cNvPr>
@@ -3530,282 +3821,444 @@
         </p:blipFill>
         <p:spPr>
           <a:xfrm>
-            <a:off x="515008" y="2528407"/>
-            <a:ext cx="4147863" cy="3347533"/>
+            <a:off x="742594" y="915297"/>
+            <a:ext cx="3025020" cy="4219903"/>
           </a:xfrm>
           <a:prstGeom prst="rect">
             <a:avLst/>
           </a:prstGeom>
         </p:spPr>
       </p:pic>
-      <p:cxnSp>
-        <p:nvCxnSpPr>
-          <p:cNvPr id="4" name="Straight Arrow Connector 3">
-            <a:extLst>
-              <a:ext uri="{FF2B5EF4-FFF2-40B4-BE49-F238E27FC236}">
-                <a16:creationId xmlns:a16="http://schemas.microsoft.com/office/drawing/2014/main" id="{91C9C2AC-09D5-DB46-A9F2-3011B471111F}"/>
-              </a:ext>
-            </a:extLst>
-          </p:cNvPr>
-          <p:cNvCxnSpPr>
-            <a:cxnSpLocks/>
-          </p:cNvCxnSpPr>
+      <p:grpSp>
+        <p:nvGrpSpPr>
+          <p:cNvPr id="19" name="Group 18">
+            <a:extLst>
+              <a:ext uri="{FF2B5EF4-FFF2-40B4-BE49-F238E27FC236}">
+                <a16:creationId xmlns:a16="http://schemas.microsoft.com/office/drawing/2014/main" id="{DC91665A-C206-6A46-BA7F-5CBA8DD975D2}"/>
+              </a:ext>
+            </a:extLst>
+          </p:cNvPr>
+          <p:cNvGrpSpPr/>
           <p:nvPr/>
-        </p:nvCxnSpPr>
-        <p:spPr>
-          <a:xfrm flipH="1" flipV="1">
-            <a:off x="3825768" y="3594542"/>
-            <a:ext cx="837103" cy="304798"/>
+        </p:nvGrpSpPr>
+        <p:grpSpPr>
+          <a:xfrm>
+            <a:off x="4567176" y="743674"/>
+            <a:ext cx="4008142" cy="4886056"/>
+            <a:chOff x="4567176" y="743674"/>
+            <a:chExt cx="4008142" cy="4886056"/>
           </a:xfrm>
-          <a:prstGeom prst="straightConnector1">
-            <a:avLst/>
-          </a:prstGeom>
-          <a:ln w="38100">
-            <a:solidFill>
-              <a:srgbClr val="FF0000"/>
-            </a:solidFill>
-            <a:tailEnd type="triangle"/>
-          </a:ln>
-        </p:spPr>
-        <p:style>
-          <a:lnRef idx="1">
-            <a:schemeClr val="accent1"/>
-          </a:lnRef>
-          <a:fillRef idx="0">
-            <a:schemeClr val="accent1"/>
-          </a:fillRef>
-          <a:effectRef idx="0">
-            <a:schemeClr val="accent1"/>
-          </a:effectRef>
-          <a:fontRef idx="minor">
-            <a:schemeClr val="tx1"/>
-          </a:fontRef>
-        </p:style>
-      </p:cxnSp>
-      <p:sp>
-        <p:nvSpPr>
-          <p:cNvPr id="8" name="TextBox 7">
-            <a:extLst>
-              <a:ext uri="{FF2B5EF4-FFF2-40B4-BE49-F238E27FC236}">
-                <a16:creationId xmlns:a16="http://schemas.microsoft.com/office/drawing/2014/main" id="{B780C25D-850D-BB45-A5AB-1A6D03AFCDD0}"/>
-              </a:ext>
-            </a:extLst>
-          </p:cNvPr>
-          <p:cNvSpPr txBox="1"/>
+        </p:grpSpPr>
+        <p:pic>
+          <p:nvPicPr>
+            <p:cNvPr id="4" name="Picture 3">
+              <a:extLst>
+                <a:ext uri="{FF2B5EF4-FFF2-40B4-BE49-F238E27FC236}">
+                  <a16:creationId xmlns:a16="http://schemas.microsoft.com/office/drawing/2014/main" id="{62F240E2-B975-8346-B989-24EB1B33BD7A}"/>
+                </a:ext>
+              </a:extLst>
+            </p:cNvPr>
+            <p:cNvPicPr>
+              <a:picLocks noChangeAspect="1"/>
+            </p:cNvPicPr>
+            <p:nvPr/>
+          </p:nvPicPr>
+          <p:blipFill>
+            <a:blip r:embed="rId3"/>
+            <a:stretch>
+              <a:fillRect/>
+            </a:stretch>
+          </p:blipFill>
+          <p:spPr>
+            <a:xfrm>
+              <a:off x="4567176" y="743674"/>
+              <a:ext cx="3668828" cy="4886056"/>
+            </a:xfrm>
+            <a:prstGeom prst="rect">
+              <a:avLst/>
+            </a:prstGeom>
+          </p:spPr>
+        </p:pic>
+        <p:cxnSp>
+          <p:nvCxnSpPr>
+            <p:cNvPr id="10" name="Straight Arrow Connector 9">
+              <a:extLst>
+                <a:ext uri="{FF2B5EF4-FFF2-40B4-BE49-F238E27FC236}">
+                  <a16:creationId xmlns:a16="http://schemas.microsoft.com/office/drawing/2014/main" id="{0AFCB3FD-DD40-B84A-9006-D3FB94E249B0}"/>
+                </a:ext>
+              </a:extLst>
+            </p:cNvPr>
+            <p:cNvCxnSpPr>
+              <a:cxnSpLocks/>
+            </p:cNvCxnSpPr>
+            <p:nvPr/>
+          </p:nvCxnSpPr>
+          <p:spPr>
+            <a:xfrm flipH="1" flipV="1">
+              <a:off x="6785438" y="2244367"/>
+              <a:ext cx="451587" cy="189303"/>
+            </a:xfrm>
+            <a:prstGeom prst="straightConnector1">
+              <a:avLst/>
+            </a:prstGeom>
+            <a:ln w="38100">
+              <a:solidFill>
+                <a:srgbClr val="FF0000"/>
+              </a:solidFill>
+              <a:tailEnd type="triangle"/>
+            </a:ln>
+          </p:spPr>
+          <p:style>
+            <a:lnRef idx="1">
+              <a:schemeClr val="accent1"/>
+            </a:lnRef>
+            <a:fillRef idx="0">
+              <a:schemeClr val="accent1"/>
+            </a:fillRef>
+            <a:effectRef idx="0">
+              <a:schemeClr val="accent1"/>
+            </a:effectRef>
+            <a:fontRef idx="minor">
+              <a:schemeClr val="tx1"/>
+            </a:fontRef>
+          </p:style>
+        </p:cxnSp>
+        <p:sp>
+          <p:nvSpPr>
+            <p:cNvPr id="11" name="TextBox 10">
+              <a:extLst>
+                <a:ext uri="{FF2B5EF4-FFF2-40B4-BE49-F238E27FC236}">
+                  <a16:creationId xmlns:a16="http://schemas.microsoft.com/office/drawing/2014/main" id="{A2827571-A1A9-3342-AF76-F67DC42F6CAE}"/>
+                </a:ext>
+              </a:extLst>
+            </p:cNvPr>
+            <p:cNvSpPr txBox="1"/>
+            <p:nvPr/>
+          </p:nvSpPr>
+          <p:spPr>
+            <a:xfrm>
+              <a:off x="7248551" y="2414368"/>
+              <a:ext cx="1142813" cy="461665"/>
+            </a:xfrm>
+            <a:prstGeom prst="rect">
+              <a:avLst/>
+            </a:prstGeom>
+            <a:noFill/>
+          </p:spPr>
+          <p:txBody>
+            <a:bodyPr wrap="none" rtlCol="0">
+              <a:spAutoFit/>
+            </a:bodyPr>
+            <a:lstStyle/>
+            <a:p>
+              <a:r>
+                <a:rPr lang="en-US" sz="1200" b="1" dirty="0">
+                  <a:solidFill>
+                    <a:srgbClr val="FF0000"/>
+                  </a:solidFill>
+                </a:rPr>
+                <a:t>Label Value = 5</a:t>
+              </a:r>
+            </a:p>
+            <a:p>
+              <a:r>
+                <a:rPr lang="en-US" sz="1200" b="1" dirty="0">
+                  <a:solidFill>
+                    <a:srgbClr val="FF0000"/>
+                  </a:solidFill>
+                </a:rPr>
+                <a:t>Bright grains</a:t>
+              </a:r>
+            </a:p>
+          </p:txBody>
+        </p:sp>
+        <p:cxnSp>
+          <p:nvCxnSpPr>
+            <p:cNvPr id="12" name="Straight Arrow Connector 11">
+              <a:extLst>
+                <a:ext uri="{FF2B5EF4-FFF2-40B4-BE49-F238E27FC236}">
+                  <a16:creationId xmlns:a16="http://schemas.microsoft.com/office/drawing/2014/main" id="{2780AD78-E1D0-1B49-8CA4-F6CFED13BEFA}"/>
+                </a:ext>
+              </a:extLst>
+            </p:cNvPr>
+            <p:cNvCxnSpPr>
+              <a:cxnSpLocks/>
+            </p:cNvCxnSpPr>
+            <p:nvPr/>
+          </p:nvCxnSpPr>
+          <p:spPr>
+            <a:xfrm flipH="1" flipV="1">
+              <a:off x="6867286" y="1616015"/>
+              <a:ext cx="545534" cy="256697"/>
+            </a:xfrm>
+            <a:prstGeom prst="straightConnector1">
+              <a:avLst/>
+            </a:prstGeom>
+            <a:ln w="38100">
+              <a:solidFill>
+                <a:srgbClr val="0070C0"/>
+              </a:solidFill>
+              <a:tailEnd type="triangle"/>
+            </a:ln>
+          </p:spPr>
+          <p:style>
+            <a:lnRef idx="1">
+              <a:schemeClr val="accent1"/>
+            </a:lnRef>
+            <a:fillRef idx="0">
+              <a:schemeClr val="accent1"/>
+            </a:fillRef>
+            <a:effectRef idx="0">
+              <a:schemeClr val="accent1"/>
+            </a:effectRef>
+            <a:fontRef idx="minor">
+              <a:schemeClr val="tx1"/>
+            </a:fontRef>
+          </p:style>
+        </p:cxnSp>
+        <p:sp>
+          <p:nvSpPr>
+            <p:cNvPr id="13" name="TextBox 12">
+              <a:extLst>
+                <a:ext uri="{FF2B5EF4-FFF2-40B4-BE49-F238E27FC236}">
+                  <a16:creationId xmlns:a16="http://schemas.microsoft.com/office/drawing/2014/main" id="{C351C1E8-1668-2041-BB64-8F132175D118}"/>
+                </a:ext>
+              </a:extLst>
+            </p:cNvPr>
+            <p:cNvSpPr txBox="1"/>
+            <p:nvPr/>
+          </p:nvSpPr>
+          <p:spPr>
+            <a:xfrm>
+              <a:off x="7412820" y="1641880"/>
+              <a:ext cx="1162498" cy="461665"/>
+            </a:xfrm>
+            <a:prstGeom prst="rect">
+              <a:avLst/>
+            </a:prstGeom>
+            <a:noFill/>
+            <a:ln>
+              <a:noFill/>
+            </a:ln>
+          </p:spPr>
+          <p:txBody>
+            <a:bodyPr wrap="none" rtlCol="0">
+              <a:spAutoFit/>
+            </a:bodyPr>
+            <a:lstStyle/>
+            <a:p>
+              <a:r>
+                <a:rPr lang="en-US" sz="1200" b="1" dirty="0">
+                  <a:solidFill>
+                    <a:srgbClr val="0070C0"/>
+                  </a:solidFill>
+                </a:rPr>
+                <a:t>Label Value = 3</a:t>
+              </a:r>
+            </a:p>
+            <a:p>
+              <a:r>
+                <a:rPr lang="en-US" sz="1200" b="1" dirty="0">
+                  <a:solidFill>
+                    <a:srgbClr val="0070C0"/>
+                  </a:solidFill>
+                </a:rPr>
+                <a:t>blue-dye epoxy</a:t>
+              </a:r>
+            </a:p>
+          </p:txBody>
+        </p:sp>
+      </p:grpSp>
+      <p:pic>
+        <p:nvPicPr>
+          <p:cNvPr id="16" name="Picture 15">
+            <a:extLst>
+              <a:ext uri="{FF2B5EF4-FFF2-40B4-BE49-F238E27FC236}">
+                <a16:creationId xmlns:a16="http://schemas.microsoft.com/office/drawing/2014/main" id="{24E4F370-BE8B-B54F-A113-F73D9D60F399}"/>
+              </a:ext>
+            </a:extLst>
+          </p:cNvPr>
+          <p:cNvPicPr>
+            <a:picLocks noChangeAspect="1"/>
+          </p:cNvPicPr>
           <p:nvPr/>
-        </p:nvSpPr>
+        </p:nvPicPr>
+        <p:blipFill>
+          <a:blip r:embed="rId4"/>
+          <a:stretch>
+            <a:fillRect/>
+          </a:stretch>
+        </p:blipFill>
         <p:spPr>
           <a:xfrm>
-            <a:off x="4662871" y="3746941"/>
-            <a:ext cx="1397883" cy="523220"/>
-          </a:xfrm>
-          <a:prstGeom prst="rect">
-            <a:avLst/>
-          </a:prstGeom>
-          <a:noFill/>
-        </p:spPr>
-        <p:txBody>
-          <a:bodyPr wrap="none" rtlCol="0">
-            <a:spAutoFit/>
-          </a:bodyPr>
-          <a:lstStyle/>
-          <a:p>
-            <a:r>
-              <a:rPr lang="en-US" sz="1400" b="1" dirty="0">
-                <a:solidFill>
-                  <a:srgbClr val="FF0000"/>
-                </a:solidFill>
-              </a:rPr>
-              <a:t>Label Value: 200</a:t>
-            </a:r>
-          </a:p>
-          <a:p>
-            <a:r>
-              <a:rPr lang="en-US" sz="1400" b="1" dirty="0">
-                <a:solidFill>
-                  <a:srgbClr val="FF0000"/>
-                </a:solidFill>
-              </a:rPr>
-              <a:t>Bright grains</a:t>
-            </a:r>
-          </a:p>
-        </p:txBody>
-      </p:sp>
-      <p:sp>
-        <p:nvSpPr>
-          <p:cNvPr id="9" name="Rectangle 8">
-            <a:extLst>
-              <a:ext uri="{FF2B5EF4-FFF2-40B4-BE49-F238E27FC236}">
-                <a16:creationId xmlns:a16="http://schemas.microsoft.com/office/drawing/2014/main" id="{300022A6-EAC0-6244-AEC3-36CBA43383D9}"/>
-              </a:ext>
-            </a:extLst>
-          </p:cNvPr>
-          <p:cNvSpPr/>
-          <p:nvPr/>
-        </p:nvSpPr>
-        <p:spPr>
-          <a:xfrm>
-            <a:off x="809297" y="352788"/>
-            <a:ext cx="6096000" cy="1785104"/>
+            <a:off x="8914631" y="483416"/>
+            <a:ext cx="3026833" cy="2514600"/>
           </a:xfrm>
           <a:prstGeom prst="rect">
             <a:avLst/>
           </a:prstGeom>
         </p:spPr>
-        <p:txBody>
-          <a:bodyPr>
-            <a:spAutoFit/>
-          </a:bodyPr>
-          <a:lstStyle/>
-          <a:p>
-            <a:r>
-              <a:rPr lang="en-US" sz="1000" b="1" dirty="0"/>
-              <a:t>﻿   label = np.zeros(gradient.shape )</a:t>
-            </a:r>
-          </a:p>
-          <a:p>
-            <a:endParaRPr lang="en-US" sz="1000" b="1" dirty="0"/>
-          </a:p>
-          <a:p>
-            <a:r>
-              <a:rPr lang="en-US" sz="1000" b="1" dirty="0"/>
-              <a:t>    label[gradient &lt; 0.25] = 1    #black grains </a:t>
-            </a:r>
-          </a:p>
-          <a:p>
-            <a:endParaRPr lang="en-US" sz="1000" b="1" dirty="0"/>
-          </a:p>
-          <a:p>
-            <a:r>
-              <a:rPr lang="en-US" sz="1000" b="1" dirty="0"/>
-              <a:t>    label[gradient &gt; 0.25] = 50   #darker grains</a:t>
-            </a:r>
-          </a:p>
-          <a:p>
-            <a:endParaRPr lang="en-US" sz="1000" b="1" dirty="0"/>
-          </a:p>
-          <a:p>
-            <a:r>
-              <a:rPr lang="en-US" sz="1000" b="1" dirty="0"/>
-              <a:t>    label[gradient &gt; 0.4]  = 100   #blue-dye epoxy or visual porosity  </a:t>
-            </a:r>
-          </a:p>
-          <a:p>
-            <a:endParaRPr lang="en-US" sz="1000" b="1" dirty="0"/>
-          </a:p>
-          <a:p>
-            <a:r>
-              <a:rPr lang="en-US" sz="1000" b="1" dirty="0"/>
-              <a:t>    label[gradient &gt; 0.6]  = 180    #darker grains </a:t>
-            </a:r>
-          </a:p>
-          <a:p>
-            <a:endParaRPr lang="en-US" sz="1000" b="1" dirty="0"/>
-          </a:p>
-          <a:p>
-            <a:r>
-              <a:rPr lang="en-US" sz="1000" b="1" dirty="0"/>
-              <a:t>    label[gradient &gt; 0.75]  = 200   #bright quartz grains </a:t>
-            </a:r>
-          </a:p>
-        </p:txBody>
-      </p:sp>
-      <p:cxnSp>
-        <p:nvCxnSpPr>
-          <p:cNvPr id="10" name="Straight Arrow Connector 9">
-            <a:extLst>
-              <a:ext uri="{FF2B5EF4-FFF2-40B4-BE49-F238E27FC236}">
-                <a16:creationId xmlns:a16="http://schemas.microsoft.com/office/drawing/2014/main" id="{69645636-A048-7A41-B981-6584AF8290EF}"/>
-              </a:ext>
-            </a:extLst>
-          </p:cNvPr>
-          <p:cNvCxnSpPr>
-            <a:cxnSpLocks/>
-          </p:cNvCxnSpPr>
+      </p:pic>
+    </p:spTree>
+    <p:extLst>
+      <p:ext uri="{BB962C8B-B14F-4D97-AF65-F5344CB8AC3E}">
+        <p14:creationId xmlns:p14="http://schemas.microsoft.com/office/powerpoint/2010/main" val="2093499215"/>
+      </p:ext>
+    </p:extLst>
+  </p:cSld>
+  <p:clrMapOvr>
+    <a:masterClrMapping/>
+  </p:clrMapOvr>
+</p:sld>
+</file>
+
+<file path=ppt/slides/slide4.xml><?xml version="1.0" encoding="utf-8"?>
+<p:sld xmlns:a="http://schemas.openxmlformats.org/drawingml/2006/main" xmlns:r="http://schemas.openxmlformats.org/officeDocument/2006/relationships" xmlns:p="http://schemas.openxmlformats.org/presentationml/2006/main">
+  <p:cSld>
+    <p:spTree>
+      <p:nvGrpSpPr>
+        <p:cNvPr id="1" name=""/>
+        <p:cNvGrpSpPr/>
+        <p:nvPr/>
+      </p:nvGrpSpPr>
+      <p:grpSpPr>
+        <a:xfrm>
+          <a:off x="0" y="0"/>
+          <a:ext cx="0" cy="0"/>
+          <a:chOff x="0" y="0"/>
+          <a:chExt cx="0" cy="0"/>
+        </a:xfrm>
+      </p:grpSpPr>
+      <p:grpSp>
+        <p:nvGrpSpPr>
+          <p:cNvPr id="6" name="Group 5">
+            <a:extLst>
+              <a:ext uri="{FF2B5EF4-FFF2-40B4-BE49-F238E27FC236}">
+                <a16:creationId xmlns:a16="http://schemas.microsoft.com/office/drawing/2014/main" id="{FF3D1AF9-FFA0-9C4F-A054-E9A6EAD36B14}"/>
+              </a:ext>
+            </a:extLst>
+          </p:cNvPr>
+          <p:cNvGrpSpPr/>
           <p:nvPr/>
-        </p:nvCxnSpPr>
-        <p:spPr>
-          <a:xfrm flipH="1" flipV="1">
-            <a:off x="3715409" y="4834096"/>
-            <a:ext cx="837103" cy="304798"/>
+        </p:nvGrpSpPr>
+        <p:grpSpPr>
+          <a:xfrm>
+            <a:off x="777768" y="667104"/>
+            <a:ext cx="6096000" cy="4835937"/>
+            <a:chOff x="777768" y="667104"/>
+            <a:chExt cx="6096000" cy="4835937"/>
           </a:xfrm>
-          <a:prstGeom prst="straightConnector1">
-            <a:avLst/>
-          </a:prstGeom>
-          <a:ln w="38100">
-            <a:solidFill>
-              <a:srgbClr val="0070C0"/>
-            </a:solidFill>
-            <a:tailEnd type="triangle"/>
-          </a:ln>
-        </p:spPr>
-        <p:style>
-          <a:lnRef idx="1">
-            <a:schemeClr val="accent1"/>
-          </a:lnRef>
-          <a:fillRef idx="0">
-            <a:schemeClr val="accent1"/>
-          </a:fillRef>
-          <a:effectRef idx="0">
-            <a:schemeClr val="accent1"/>
-          </a:effectRef>
-          <a:fontRef idx="minor">
-            <a:schemeClr val="tx1"/>
-          </a:fontRef>
-        </p:style>
-      </p:cxnSp>
-      <p:sp>
-        <p:nvSpPr>
-          <p:cNvPr id="11" name="TextBox 10">
-            <a:extLst>
-              <a:ext uri="{FF2B5EF4-FFF2-40B4-BE49-F238E27FC236}">
-                <a16:creationId xmlns:a16="http://schemas.microsoft.com/office/drawing/2014/main" id="{94500A56-967A-4B41-8083-70FE94566FF6}"/>
-              </a:ext>
-            </a:extLst>
-          </p:cNvPr>
-          <p:cNvSpPr txBox="1"/>
-          <p:nvPr/>
-        </p:nvSpPr>
-        <p:spPr>
-          <a:xfrm>
-            <a:off x="4552512" y="4986495"/>
-            <a:ext cx="1397883" cy="523220"/>
-          </a:xfrm>
-          <a:prstGeom prst="rect">
-            <a:avLst/>
-          </a:prstGeom>
-          <a:noFill/>
-          <a:ln>
-            <a:noFill/>
-          </a:ln>
-        </p:spPr>
-        <p:txBody>
-          <a:bodyPr wrap="none" rtlCol="0">
-            <a:spAutoFit/>
-          </a:bodyPr>
-          <a:lstStyle/>
-          <a:p>
-            <a:r>
-              <a:rPr lang="en-US" sz="1400" b="1" dirty="0">
-                <a:solidFill>
-                  <a:srgbClr val="0070C0"/>
-                </a:solidFill>
-              </a:rPr>
-              <a:t>Label Value: 100</a:t>
-            </a:r>
-          </a:p>
-          <a:p>
-            <a:r>
-              <a:rPr lang="en-US" sz="1400" b="1" dirty="0">
-                <a:solidFill>
-                  <a:srgbClr val="0070C0"/>
-                </a:solidFill>
-              </a:rPr>
-              <a:t>blue-dye epoxy</a:t>
-            </a:r>
-          </a:p>
-        </p:txBody>
-      </p:sp>
+        </p:grpSpPr>
+        <p:sp>
+          <p:nvSpPr>
+            <p:cNvPr id="9" name="Rectangle 8">
+              <a:extLst>
+                <a:ext uri="{FF2B5EF4-FFF2-40B4-BE49-F238E27FC236}">
+                  <a16:creationId xmlns:a16="http://schemas.microsoft.com/office/drawing/2014/main" id="{300022A6-EAC0-6244-AEC3-36CBA43383D9}"/>
+                </a:ext>
+              </a:extLst>
+            </p:cNvPr>
+            <p:cNvSpPr/>
+            <p:nvPr/>
+          </p:nvSpPr>
+          <p:spPr>
+            <a:xfrm>
+              <a:off x="777768" y="667104"/>
+              <a:ext cx="6096000" cy="1785104"/>
+            </a:xfrm>
+            <a:prstGeom prst="rect">
+              <a:avLst/>
+            </a:prstGeom>
+          </p:spPr>
+          <p:txBody>
+            <a:bodyPr>
+              <a:spAutoFit/>
+            </a:bodyPr>
+            <a:lstStyle/>
+            <a:p>
+              <a:r>
+                <a:rPr lang="en-US" sz="1000" b="1" dirty="0"/>
+                <a:t>﻿   label = np.zeros(gradient.shape )</a:t>
+              </a:r>
+            </a:p>
+            <a:p>
+              <a:endParaRPr lang="en-US" sz="1000" b="1" dirty="0"/>
+            </a:p>
+            <a:p>
+              <a:r>
+                <a:rPr lang="en-US" sz="1000" b="1" dirty="0"/>
+                <a:t>    label[gradient &lt; 0.25] = 1    #black grains </a:t>
+              </a:r>
+            </a:p>
+            <a:p>
+              <a:endParaRPr lang="en-US" sz="1000" b="1" dirty="0"/>
+            </a:p>
+            <a:p>
+              <a:r>
+                <a:rPr lang="en-US" sz="1000" b="1" dirty="0"/>
+                <a:t>    label[gradient &gt; 0.25] = 2   #darker grains</a:t>
+              </a:r>
+            </a:p>
+            <a:p>
+              <a:endParaRPr lang="en-US" sz="1000" b="1" dirty="0"/>
+            </a:p>
+            <a:p>
+              <a:r>
+                <a:rPr lang="en-US" sz="1000" b="1" dirty="0"/>
+                <a:t>    label[gradient &gt; 0.4]  = 3    #blue-dye epoxy or visual porosity  </a:t>
+              </a:r>
+            </a:p>
+            <a:p>
+              <a:endParaRPr lang="en-US" sz="1000" b="1" dirty="0"/>
+            </a:p>
+            <a:p>
+              <a:r>
+                <a:rPr lang="en-US" sz="1000" b="1" dirty="0"/>
+                <a:t>    label[gradient &gt; 0.6]  = 4    #darker grains </a:t>
+              </a:r>
+            </a:p>
+            <a:p>
+              <a:endParaRPr lang="en-US" sz="1000" b="1" dirty="0"/>
+            </a:p>
+            <a:p>
+              <a:r>
+                <a:rPr lang="en-US" sz="1000" b="1" dirty="0"/>
+                <a:t>    label[gradient &gt; 0.75]  = 5   #bright quartz grains </a:t>
+              </a:r>
+            </a:p>
+          </p:txBody>
+        </p:sp>
+        <p:pic>
+          <p:nvPicPr>
+            <p:cNvPr id="5" name="Picture 4">
+              <a:extLst>
+                <a:ext uri="{FF2B5EF4-FFF2-40B4-BE49-F238E27FC236}">
+                  <a16:creationId xmlns:a16="http://schemas.microsoft.com/office/drawing/2014/main" id="{E17608E4-737A-A540-A1D7-AA8292D0041F}"/>
+                </a:ext>
+              </a:extLst>
+            </p:cNvPr>
+            <p:cNvPicPr>
+              <a:picLocks noChangeAspect="1"/>
+            </p:cNvPicPr>
+            <p:nvPr/>
+          </p:nvPicPr>
+          <p:blipFill>
+            <a:blip r:embed="rId2"/>
+            <a:stretch>
+              <a:fillRect/>
+            </a:stretch>
+          </p:blipFill>
+          <p:spPr>
+            <a:xfrm>
+              <a:off x="777768" y="2658241"/>
+              <a:ext cx="5016500" cy="2844800"/>
+            </a:xfrm>
+            <a:prstGeom prst="rect">
+              <a:avLst/>
+            </a:prstGeom>
+          </p:spPr>
+        </p:pic>
+      </p:grpSp>
     </p:spTree>
     <p:extLst>
       <p:ext uri="{BB962C8B-B14F-4D97-AF65-F5344CB8AC3E}">

</xml_diff>